<commit_message>
- formelle Prüfung - inhaltliche Vorschläge zu Teil 3
</commit_message>
<xml_diff>
--- a/Präsentation ohne Ausgeblendete Folie.pptx
+++ b/Präsentation ohne Ausgeblendete Folie.pptx
@@ -160,7 +160,7 @@
   </p:defaultTextStyle>
   <p:extLst>
     <p:ext uri="{521415D9-36F7-43E2-AB2F-B90AF26B5E84}">
-      <p14:sectionLst xmlns:p14="http://schemas.microsoft.com/office/powerpoint/2010/main">
+      <p14:sectionLst xmlns:p14="http://schemas.microsoft.com/office/powerpoint/2010/main" xmlns="">
         <p14:section name="Fachlabor IT" id="{DED19D9C-E72F-4B67-BED8-A255EA795F3F}">
           <p14:sldIdLst>
             <p14:sldId id="256"/>
@@ -211,7 +211,7 @@
       </p14:sectionLst>
     </p:ext>
     <p:ext uri="{EFAFB233-063F-42B5-8137-9DF3F51BA10A}">
-      <p15:sldGuideLst xmlns:p15="http://schemas.microsoft.com/office/powerpoint/2012/main">
+      <p15:sldGuideLst xmlns:p15="http://schemas.microsoft.com/office/powerpoint/2012/main" xmlns="">
         <p15:guide id="1" orient="horz" pos="935" userDrawn="1">
           <p15:clr>
             <a:srgbClr val="A4A3A4"/>
@@ -225,7 +225,7 @@
       </p15:sldGuideLst>
     </p:ext>
     <p:ext uri="{2D200454-40CA-4A62-9FC3-DE9A4176ACB9}">
-      <p15:notesGuideLst xmlns:p15="http://schemas.microsoft.com/office/powerpoint/2012/main">
+      <p15:notesGuideLst xmlns:p15="http://schemas.microsoft.com/office/powerpoint/2012/main" xmlns="">
         <p15:guide id="1" orient="horz" pos="3132">
           <p15:clr>
             <a:srgbClr val="A4A3A4"/>
@@ -465,7 +465,7 @@
     </p:spTree>
     <p:extLst>
       <p:ext uri="{BB962C8B-B14F-4D97-AF65-F5344CB8AC3E}">
-        <p14:creationId xmlns:p14="http://schemas.microsoft.com/office/powerpoint/2010/main" val="2340697763"/>
+        <p14:creationId xmlns:p14="http://schemas.microsoft.com/office/powerpoint/2010/main" xmlns="" val="2340697763"/>
       </p:ext>
     </p:extLst>
   </p:cSld>
@@ -795,7 +795,7 @@
     </p:spTree>
     <p:extLst>
       <p:ext uri="{BB962C8B-B14F-4D97-AF65-F5344CB8AC3E}">
-        <p14:creationId xmlns:p14="http://schemas.microsoft.com/office/powerpoint/2010/main" val="3722097906"/>
+        <p14:creationId xmlns:p14="http://schemas.microsoft.com/office/powerpoint/2010/main" xmlns="" val="3722097906"/>
       </p:ext>
     </p:extLst>
   </p:cSld>
@@ -1019,7 +1019,7 @@
     </p:spTree>
     <p:extLst>
       <p:ext uri="{BB962C8B-B14F-4D97-AF65-F5344CB8AC3E}">
-        <p14:creationId xmlns:p14="http://schemas.microsoft.com/office/powerpoint/2010/main" val="3197195781"/>
+        <p14:creationId xmlns:p14="http://schemas.microsoft.com/office/powerpoint/2010/main" xmlns="" val="3197195781"/>
       </p:ext>
     </p:extLst>
   </p:cSld>
@@ -1228,7 +1228,7 @@
     </p:spTree>
     <p:extLst>
       <p:ext uri="{BB962C8B-B14F-4D97-AF65-F5344CB8AC3E}">
-        <p14:creationId xmlns:p14="http://schemas.microsoft.com/office/powerpoint/2010/main" val="2132037008"/>
+        <p14:creationId xmlns:p14="http://schemas.microsoft.com/office/powerpoint/2010/main" xmlns="" val="2132037008"/>
       </p:ext>
     </p:extLst>
   </p:cSld>
@@ -1323,7 +1323,7 @@
     </p:spTree>
     <p:extLst>
       <p:ext uri="{BB962C8B-B14F-4D97-AF65-F5344CB8AC3E}">
-        <p14:creationId xmlns:p14="http://schemas.microsoft.com/office/powerpoint/2010/main" val="3022281367"/>
+        <p14:creationId xmlns:p14="http://schemas.microsoft.com/office/powerpoint/2010/main" xmlns="" val="3022281367"/>
       </p:ext>
     </p:extLst>
   </p:cSld>
@@ -1352,6 +1352,93 @@
       </p:grpSpPr>
       <p:sp>
         <p:nvSpPr>
+          <p:cNvPr id="2" name="Folienbildplatzhalter 1"/>
+          <p:cNvSpPr>
+            <a:spLocks noGrp="1" noRot="1" noChangeAspect="1"/>
+          </p:cNvSpPr>
+          <p:nvPr>
+            <p:ph type="sldImg"/>
+          </p:nvPr>
+        </p:nvSpPr>
+        <p:spPr/>
+      </p:sp>
+      <p:sp>
+        <p:nvSpPr>
+          <p:cNvPr id="3" name="Notizenplatzhalter 2"/>
+          <p:cNvSpPr>
+            <a:spLocks noGrp="1"/>
+          </p:cNvSpPr>
+          <p:nvPr>
+            <p:ph type="body" idx="1"/>
+          </p:nvPr>
+        </p:nvSpPr>
+        <p:spPr/>
+        <p:txBody>
+          <a:bodyPr>
+            <a:normAutofit/>
+          </a:bodyPr>
+          <a:lstStyle/>
+          <a:p>
+            <a:endParaRPr lang="de-DE" dirty="0"/>
+          </a:p>
+        </p:txBody>
+      </p:sp>
+      <p:sp>
+        <p:nvSpPr>
+          <p:cNvPr id="4" name="Foliennummernplatzhalter 3"/>
+          <p:cNvSpPr>
+            <a:spLocks noGrp="1"/>
+          </p:cNvSpPr>
+          <p:nvPr>
+            <p:ph type="sldNum" sz="quarter" idx="10"/>
+          </p:nvPr>
+        </p:nvSpPr>
+        <p:spPr/>
+        <p:txBody>
+          <a:bodyPr/>
+          <a:lstStyle/>
+          <a:p>
+            <a:pPr>
+              <a:defRPr/>
+            </a:pPr>
+            <a:fld id="{D0E03ECB-004C-4CA3-8342-0B234B233A94}" type="slidenum">
+              <a:rPr lang="de-DE" smtClean="0"/>
+              <a:pPr>
+                <a:defRPr/>
+              </a:pPr>
+              <a:t>18</a:t>
+            </a:fld>
+            <a:endParaRPr lang="de-DE"/>
+          </a:p>
+        </p:txBody>
+      </p:sp>
+    </p:spTree>
+  </p:cSld>
+  <p:clrMapOvr>
+    <a:masterClrMapping/>
+  </p:clrMapOvr>
+</p:notes>
+</file>
+
+<file path=ppt/notesSlides/notesSlide6.xml><?xml version="1.0" encoding="utf-8"?>
+<p:notes xmlns:a="http://schemas.openxmlformats.org/drawingml/2006/main" xmlns:r="http://schemas.openxmlformats.org/officeDocument/2006/relationships" xmlns:p="http://schemas.openxmlformats.org/presentationml/2006/main">
+  <p:cSld>
+    <p:spTree>
+      <p:nvGrpSpPr>
+        <p:cNvPr id="1" name=""/>
+        <p:cNvGrpSpPr/>
+        <p:nvPr/>
+      </p:nvGrpSpPr>
+      <p:grpSpPr>
+        <a:xfrm>
+          <a:off x="0" y="0"/>
+          <a:ext cx="0" cy="0"/>
+          <a:chOff x="0" y="0"/>
+          <a:chExt cx="0" cy="0"/>
+        </a:xfrm>
+      </p:grpSpPr>
+      <p:sp>
+        <p:nvSpPr>
           <p:cNvPr id="29698" name="Rectangle 7"/>
           <p:cNvSpPr>
             <a:spLocks noGrp="1" noChangeArrowheads="1"/>
@@ -1427,7 +1514,7 @@
     </p:spTree>
     <p:extLst>
       <p:ext uri="{BB962C8B-B14F-4D97-AF65-F5344CB8AC3E}">
-        <p14:creationId xmlns:p14="http://schemas.microsoft.com/office/powerpoint/2010/main" val="3140753640"/>
+        <p14:creationId xmlns:p14="http://schemas.microsoft.com/office/powerpoint/2010/main" xmlns="" val="3140753640"/>
       </p:ext>
     </p:extLst>
   </p:cSld>
@@ -1867,7 +1954,7 @@
   </p:clrMapOvr>
   <p:extLst mod="1">
     <p:ext uri="{DCECCB84-F9BA-43D5-87BE-67443E8EF086}">
-      <p15:sldGuideLst xmlns:p15="http://schemas.microsoft.com/office/powerpoint/2012/main">
+      <p15:sldGuideLst xmlns:p15="http://schemas.microsoft.com/office/powerpoint/2012/main" xmlns="">
         <p15:guide id="1" orient="horz" pos="2160" userDrawn="1">
           <p15:clr>
             <a:srgbClr val="FBAE40"/>
@@ -3484,7 +3571,7 @@
           </a:ln>
           <a:extLst>
             <a:ext uri="{91240B29-F687-4F45-9708-019B960494DF}">
-              <a14:hiddenLine xmlns:a14="http://schemas.microsoft.com/office/drawing/2010/main" w="9525">
+              <a14:hiddenLine xmlns:a14="http://schemas.microsoft.com/office/drawing/2010/main" xmlns="" w="9525">
                 <a:solidFill>
                   <a:srgbClr val="000000"/>
                 </a:solidFill>
@@ -3579,7 +3666,7 @@
           </a:ln>
           <a:extLst>
             <a:ext uri="{91240B29-F687-4F45-9708-019B960494DF}">
-              <a14:hiddenLine xmlns:a14="http://schemas.microsoft.com/office/drawing/2010/main" w="9525">
+              <a14:hiddenLine xmlns:a14="http://schemas.microsoft.com/office/drawing/2010/main" xmlns="" w="9525">
                 <a:solidFill>
                   <a:srgbClr val="000000"/>
                 </a:solidFill>
@@ -3674,7 +3761,7 @@
           </a:ln>
           <a:extLst>
             <a:ext uri="{91240B29-F687-4F45-9708-019B960494DF}">
-              <a14:hiddenLine xmlns:a14="http://schemas.microsoft.com/office/drawing/2010/main" w="9525">
+              <a14:hiddenLine xmlns:a14="http://schemas.microsoft.com/office/drawing/2010/main" xmlns="" w="9525">
                 <a:solidFill>
                   <a:srgbClr val="000000"/>
                 </a:solidFill>
@@ -4706,7 +4793,7 @@
     </p:spTree>
     <p:extLst>
       <p:ext uri="{BB962C8B-B14F-4D97-AF65-F5344CB8AC3E}">
-        <p14:creationId xmlns:p14="http://schemas.microsoft.com/office/powerpoint/2010/main" val="2895349213"/>
+        <p14:creationId xmlns:p14="http://schemas.microsoft.com/office/powerpoint/2010/main" xmlns="" val="2895349213"/>
       </p:ext>
     </p:extLst>
   </p:cSld>
@@ -4714,6 +4801,13 @@
     <a:masterClrMapping/>
   </p:clrMapOvr>
   <p:transition/>
+  <p:timing>
+    <p:tnLst>
+      <p:par>
+        <p:cTn id="1" dur="indefinite" restart="never" nodeType="tmRoot"/>
+      </p:par>
+    </p:tnLst>
+  </p:timing>
 </p:sld>
 </file>
 
@@ -4807,8 +4901,16 @@
           <a:lstStyle/>
           <a:p>
             <a:r>
+              <a:rPr lang="de-DE" dirty="0" err="1"/>
+              <a:t>m</a:t>
+            </a:r>
+            <a:r>
+              <a:rPr lang="de-DE" dirty="0" err="1" smtClean="0"/>
+              <a:t>ain</a:t>
+            </a:r>
+            <a:r>
               <a:rPr lang="de-DE" dirty="0"/>
-              <a:t>Main()</a:t>
+              <a:t>()</a:t>
             </a:r>
           </a:p>
         </p:txBody>
@@ -4949,13 +5051,20 @@
     </p:spTree>
     <p:extLst>
       <p:ext uri="{BB962C8B-B14F-4D97-AF65-F5344CB8AC3E}">
-        <p14:creationId xmlns:p14="http://schemas.microsoft.com/office/powerpoint/2010/main" val="4216422739"/>
+        <p14:creationId xmlns:p14="http://schemas.microsoft.com/office/powerpoint/2010/main" xmlns="" val="4216422739"/>
       </p:ext>
     </p:extLst>
   </p:cSld>
   <p:clrMapOvr>
     <a:masterClrMapping/>
   </p:clrMapOvr>
+  <p:timing>
+    <p:tnLst>
+      <p:par>
+        <p:cTn id="1" dur="indefinite" restart="never" nodeType="tmRoot"/>
+      </p:par>
+    </p:tnLst>
+  </p:timing>
 </p:sld>
 </file>
 
@@ -5140,13 +5249,20 @@
     </p:spTree>
     <p:extLst>
       <p:ext uri="{BB962C8B-B14F-4D97-AF65-F5344CB8AC3E}">
-        <p14:creationId xmlns:p14="http://schemas.microsoft.com/office/powerpoint/2010/main" val="1466112408"/>
+        <p14:creationId xmlns:p14="http://schemas.microsoft.com/office/powerpoint/2010/main" xmlns="" val="1466112408"/>
       </p:ext>
     </p:extLst>
   </p:cSld>
   <p:clrMapOvr>
     <a:masterClrMapping/>
   </p:clrMapOvr>
+  <p:timing>
+    <p:tnLst>
+      <p:par>
+        <p:cTn id="1" dur="indefinite" restart="never" nodeType="tmRoot"/>
+      </p:par>
+    </p:tnLst>
+  </p:timing>
 </p:sld>
 </file>
 
@@ -5387,13 +5503,20 @@
     </p:spTree>
     <p:extLst>
       <p:ext uri="{BB962C8B-B14F-4D97-AF65-F5344CB8AC3E}">
-        <p14:creationId xmlns:p14="http://schemas.microsoft.com/office/powerpoint/2010/main" val="1836390994"/>
+        <p14:creationId xmlns:p14="http://schemas.microsoft.com/office/powerpoint/2010/main" xmlns="" val="1836390994"/>
       </p:ext>
     </p:extLst>
   </p:cSld>
   <p:clrMapOvr>
     <a:masterClrMapping/>
   </p:clrMapOvr>
+  <p:timing>
+    <p:tnLst>
+      <p:par>
+        <p:cTn id="1" dur="indefinite" restart="never" nodeType="tmRoot"/>
+      </p:par>
+    </p:tnLst>
+  </p:timing>
 </p:sld>
 </file>
 
@@ -5430,9 +5553,10 @@
           <a:lstStyle/>
           <a:p>
             <a:r>
-              <a:rPr lang="de-DE"/>
-              <a:t>Etagenlogik</a:t>
-            </a:r>
+              <a:rPr lang="de-DE" dirty="0" smtClean="0"/>
+              <a:t>Herausforderungen bei der Etagenlogik</a:t>
+            </a:r>
+            <a:endParaRPr lang="de-DE" dirty="0"/>
           </a:p>
         </p:txBody>
       </p:sp>
@@ -5559,53 +5683,64 @@
         <p:spPr>
           <a:xfrm>
             <a:off x="738204" y="1401763"/>
-            <a:ext cx="7342187" cy="2462213"/>
+            <a:ext cx="7342187" cy="2092881"/>
           </a:xfrm>
         </p:spPr>
         <p:txBody>
           <a:bodyPr/>
           <a:lstStyle/>
+          <a:p>
+            <a:r>
+              <a:rPr lang="de-DE" dirty="0" smtClean="0"/>
+              <a:t>Keine </a:t>
+            </a:r>
+            <a:r>
+              <a:rPr lang="de-DE" dirty="0"/>
+              <a:t>elegante Umsetzung durch verschachtelte </a:t>
+            </a:r>
+            <a:r>
+              <a:rPr lang="de-DE" dirty="0" err="1"/>
+              <a:t>while</a:t>
+            </a:r>
+            <a:r>
+              <a:rPr lang="de-DE" dirty="0"/>
+              <a:t>-Schleifen</a:t>
+            </a:r>
+          </a:p>
+          <a:p>
+            <a:pPr marL="342900" lvl="1" indent="-342900">
+              <a:buSzPct val="120000"/>
+            </a:pPr>
+            <a:r>
+              <a:rPr lang="de-DE" dirty="0"/>
+              <a:t>Wenn auf einer Etage angekommen: Tür soll öffnen -&gt; </a:t>
+            </a:r>
+            <a:r>
+              <a:rPr lang="de-DE" dirty="0" err="1"/>
+              <a:t>while</a:t>
+            </a:r>
+            <a:r>
+              <a:rPr lang="de-DE" dirty="0"/>
+              <a:t>-Schleife wartet </a:t>
+            </a:r>
+          </a:p>
+          <a:p>
+            <a:endParaRPr lang="de-DE" dirty="0"/>
+          </a:p>
+          <a:p>
+            <a:pPr marL="363538" lvl="1" indent="0">
+              <a:buNone/>
+            </a:pPr>
+            <a:r>
+              <a:rPr lang="de-DE" dirty="0"/>
+              <a:t>	</a:t>
+            </a:r>
+          </a:p>
           <a:p>
             <a:pPr marL="0" indent="0">
               <a:buNone/>
             </a:pPr>
-            <a:r>
-              <a:rPr lang="de-DE"/>
-              <a:t>Probleme</a:t>
-            </a:r>
-          </a:p>
-          <a:p>
-            <a:r>
-              <a:rPr lang="de-DE"/>
-              <a:t>Keine elegante Umsetzung durch verschachtelte while-Schleifen</a:t>
-            </a:r>
-          </a:p>
-          <a:p>
-            <a:pPr marL="342900" lvl="1" indent="-342900">
-              <a:buSzPct val="120000"/>
-            </a:pPr>
-            <a:r>
-              <a:rPr lang="de-DE"/>
-              <a:t>Wenn auf einer Etage angekommen: Tür soll öffnen -&gt; while-Schleife wartet </a:t>
-            </a:r>
-          </a:p>
-          <a:p>
-            <a:endParaRPr lang="de-DE"/>
-          </a:p>
-          <a:p>
-            <a:pPr marL="363538" lvl="1" indent="0">
-              <a:buNone/>
-            </a:pPr>
-            <a:r>
-              <a:rPr lang="de-DE"/>
-              <a:t>	</a:t>
-            </a:r>
-          </a:p>
-          <a:p>
-            <a:pPr marL="0" indent="0">
-              <a:buNone/>
-            </a:pPr>
-            <a:endParaRPr lang="de-DE"/>
+            <a:endParaRPr lang="de-DE" dirty="0"/>
           </a:p>
         </p:txBody>
       </p:sp>
@@ -5621,7 +5756,7 @@
           <a:blip r:embed="rId2">
             <a:extLst>
               <a:ext uri="{28A0092B-C50C-407E-A947-70E740481C1C}">
-                <a14:useLocalDpi xmlns:a14="http://schemas.microsoft.com/office/drawing/2010/main" val="0"/>
+                <a14:useLocalDpi xmlns:a14="http://schemas.microsoft.com/office/drawing/2010/main" xmlns="" val="0"/>
               </a:ext>
             </a:extLst>
           </a:blip>
@@ -5644,14 +5779,14 @@
           </a:ln>
           <a:extLst>
             <a:ext uri="{909E8E84-426E-40DD-AFC4-6F175D3DCCD1}">
-              <a14:hiddenFill xmlns:a14="http://schemas.microsoft.com/office/drawing/2010/main">
+              <a14:hiddenFill xmlns:a14="http://schemas.microsoft.com/office/drawing/2010/main" xmlns="">
                 <a:solidFill>
                   <a:schemeClr val="accent1"/>
                 </a:solidFill>
               </a14:hiddenFill>
             </a:ext>
             <a:ext uri="{91240B29-F687-4F45-9708-019B960494DF}">
-              <a14:hiddenLine xmlns:a14="http://schemas.microsoft.com/office/drawing/2010/main" w="9525">
+              <a14:hiddenLine xmlns:a14="http://schemas.microsoft.com/office/drawing/2010/main" xmlns="" w="9525">
                 <a:solidFill>
                   <a:schemeClr val="tx1"/>
                 </a:solidFill>
@@ -5760,12 +5895,28 @@
           <a:lstStyle/>
           <a:p>
             <a:r>
-              <a:rPr lang="de-DE">
+              <a:rPr lang="de-DE" dirty="0">
                 <a:solidFill>
                   <a:srgbClr val="FF0000"/>
                 </a:solidFill>
               </a:rPr>
-              <a:t>So keine parallele Erkennung von z.B. weiteren Ruftastereingaben möglich, das Programm ist lokal „pausiert“</a:t>
+              <a:t>So keine parallele Erkennung von z.B. weiteren </a:t>
+            </a:r>
+            <a:r>
+              <a:rPr lang="de-DE" dirty="0" err="1">
+                <a:solidFill>
+                  <a:srgbClr val="FF0000"/>
+                </a:solidFill>
+              </a:rPr>
+              <a:t>Ruftastereingaben</a:t>
+            </a:r>
+            <a:r>
+              <a:rPr lang="de-DE" dirty="0">
+                <a:solidFill>
+                  <a:srgbClr val="FF0000"/>
+                </a:solidFill>
+              </a:rPr>
+              <a:t> möglich, das Programm ist lokal „pausiert“</a:t>
             </a:r>
           </a:p>
         </p:txBody>
@@ -5773,7 +5924,7 @@
     </p:spTree>
     <p:extLst>
       <p:ext uri="{BB962C8B-B14F-4D97-AF65-F5344CB8AC3E}">
-        <p14:creationId xmlns:p14="http://schemas.microsoft.com/office/powerpoint/2010/main" val="4058165542"/>
+        <p14:creationId xmlns:p14="http://schemas.microsoft.com/office/powerpoint/2010/main" xmlns="" val="4058165542"/>
       </p:ext>
     </p:extLst>
   </p:cSld>
@@ -5948,9 +6099,10 @@
           <a:lstStyle/>
           <a:p>
             <a:r>
-              <a:rPr lang="de-DE"/>
-              <a:t>Etagenlogik</a:t>
-            </a:r>
+              <a:rPr lang="de-DE" dirty="0" smtClean="0"/>
+              <a:t>Lösung und Umsetzung</a:t>
+            </a:r>
+            <a:endParaRPr lang="de-DE" dirty="0"/>
           </a:p>
         </p:txBody>
       </p:sp>
@@ -6077,55 +6229,141 @@
         <p:spPr>
           <a:xfrm>
             <a:off x="738204" y="1401763"/>
-            <a:ext cx="7342187" cy="2462213"/>
+            <a:ext cx="7342187" cy="1723549"/>
           </a:xfrm>
         </p:spPr>
         <p:txBody>
           <a:bodyPr/>
           <a:lstStyle/>
+          <a:p>
+            <a:r>
+              <a:rPr lang="de-DE" dirty="0" smtClean="0"/>
+              <a:t>Ständiges </a:t>
+            </a:r>
+            <a:r>
+              <a:rPr lang="de-DE" dirty="0"/>
+              <a:t>„Hineinspringen“ aus der </a:t>
+            </a:r>
+            <a:r>
+              <a:rPr lang="de-DE" dirty="0" err="1"/>
+              <a:t>main</a:t>
+            </a:r>
+            <a:r>
+              <a:rPr lang="de-DE" dirty="0"/>
+              <a:t>()</a:t>
+            </a:r>
+          </a:p>
+          <a:p>
+            <a:r>
+              <a:rPr lang="de-DE" dirty="0"/>
+              <a:t>Ausführungslogik über Klassenvariable </a:t>
+            </a:r>
+            <a:r>
+              <a:rPr lang="de-DE" dirty="0" err="1"/>
+              <a:t>FloorStatus</a:t>
+            </a:r>
+            <a:endParaRPr lang="de-DE" dirty="0"/>
+          </a:p>
+          <a:p>
+            <a:pPr lvl="1"/>
+            <a:r>
+              <a:rPr lang="de-DE" dirty="0"/>
+              <a:t>Nur aktueller Schritt wird durchgeführt und zurückspringen in die </a:t>
+            </a:r>
+            <a:r>
+              <a:rPr lang="de-DE" dirty="0" err="1" smtClean="0"/>
+              <a:t>main</a:t>
+            </a:r>
+            <a:endParaRPr lang="de-DE" dirty="0"/>
+          </a:p>
           <a:p>
             <a:pPr marL="0" indent="0">
               <a:buNone/>
             </a:pPr>
-            <a:r>
-              <a:rPr lang="de-DE"/>
-              <a:t>Lösung</a:t>
-            </a:r>
-          </a:p>
-          <a:p>
-            <a:r>
-              <a:rPr lang="de-DE"/>
-              <a:t>Ständiges „Hineinspringen“ aus der main()</a:t>
-            </a:r>
-          </a:p>
-          <a:p>
-            <a:r>
-              <a:rPr lang="de-DE"/>
-              <a:t>Ausführungslogik über Klassenvariable FloorStatus</a:t>
-            </a:r>
-          </a:p>
-          <a:p>
-            <a:pPr lvl="1"/>
-            <a:r>
-              <a:rPr lang="de-DE"/>
-              <a:t>Nur aktueller Schritt wird durchgeführt und zurückspringen in die main</a:t>
-            </a:r>
-          </a:p>
-          <a:p>
-            <a:endParaRPr lang="de-DE"/>
-          </a:p>
-          <a:p>
-            <a:pPr marL="0" indent="0">
+            <a:endParaRPr lang="de-DE" dirty="0"/>
+          </a:p>
+        </p:txBody>
+      </p:sp>
+      <p:sp>
+        <p:nvSpPr>
+          <p:cNvPr id="7" name="Rechteck 6"/>
+          <p:cNvSpPr/>
+          <p:nvPr/>
+        </p:nvSpPr>
+        <p:spPr bwMode="auto">
+          <a:xfrm>
+            <a:off x="3059832" y="3861048"/>
+            <a:ext cx="4206990" cy="732582"/>
+          </a:xfrm>
+          <a:prstGeom prst="rect">
+            <a:avLst/>
+          </a:prstGeom>
+          <a:ln>
+            <a:headEnd type="none" w="med" len="med"/>
+            <a:tailEnd type="none" w="med" len="med"/>
+          </a:ln>
+        </p:spPr>
+        <p:style>
+          <a:lnRef idx="2">
+            <a:schemeClr val="dk1">
+              <a:shade val="50000"/>
+            </a:schemeClr>
+          </a:lnRef>
+          <a:fillRef idx="1">
+            <a:schemeClr val="dk1"/>
+          </a:fillRef>
+          <a:effectRef idx="0">
+            <a:schemeClr val="dk1"/>
+          </a:effectRef>
+          <a:fontRef idx="minor">
+            <a:schemeClr val="lt1"/>
+          </a:fontRef>
+        </p:style>
+        <p:txBody>
+          <a:bodyPr vert="horz" wrap="none" lIns="91440" tIns="45720" rIns="91440" bIns="45720" numCol="1" rtlCol="0" anchor="ctr" anchorCtr="0" compatLnSpc="1">
+            <a:prstTxWarp prst="textNoShape">
+              <a:avLst/>
+            </a:prstTxWarp>
+          </a:bodyPr>
+          <a:lstStyle/>
+          <a:p>
+            <a:pPr marL="0" marR="0" indent="0" algn="ctr" defTabSz="914400" rtl="0" eaLnBrk="1" fontAlgn="base" latinLnBrk="0" hangingPunct="1">
+              <a:lnSpc>
+                <a:spcPct val="100000"/>
+              </a:lnSpc>
+              <a:spcBef>
+                <a:spcPct val="0"/>
+              </a:spcBef>
+              <a:spcAft>
+                <a:spcPct val="0"/>
+              </a:spcAft>
+              <a:buClrTx/>
+              <a:buSzTx/>
+              <a:buFontTx/>
               <a:buNone/>
+              <a:tabLst/>
             </a:pPr>
-            <a:endParaRPr lang="de-DE"/>
+            <a:r>
+              <a:rPr lang="de-DE" sz="1800" dirty="0" smtClean="0"/>
+              <a:t>Inhalte in folgende Folie integrieren?</a:t>
+            </a:r>
+            <a:endParaRPr kumimoji="0" lang="de-DE" sz="1800" b="0" i="0" u="none" strike="noStrike" cap="none" normalizeH="0" baseline="0" dirty="0" smtClean="0">
+              <a:ln>
+                <a:noFill/>
+              </a:ln>
+              <a:solidFill>
+                <a:schemeClr val="tx1"/>
+              </a:solidFill>
+              <a:effectLst/>
+              <a:latin typeface="Arial" charset="0"/>
+            </a:endParaRPr>
           </a:p>
         </p:txBody>
       </p:sp>
     </p:spTree>
     <p:extLst>
       <p:ext uri="{BB962C8B-B14F-4D97-AF65-F5344CB8AC3E}">
-        <p14:creationId xmlns:p14="http://schemas.microsoft.com/office/powerpoint/2010/main" val="2383928734"/>
+        <p14:creationId xmlns:p14="http://schemas.microsoft.com/office/powerpoint/2010/main" xmlns="" val="2383928734"/>
       </p:ext>
     </p:extLst>
   </p:cSld>
@@ -6296,7 +6534,7 @@
           <a:blip r:embed="rId2">
             <a:extLst>
               <a:ext uri="{28A0092B-C50C-407E-A947-70E740481C1C}">
-                <a14:useLocalDpi xmlns:a14="http://schemas.microsoft.com/office/drawing/2010/main" val="0"/>
+                <a14:useLocalDpi xmlns:a14="http://schemas.microsoft.com/office/drawing/2010/main" xmlns="" val="0"/>
               </a:ext>
             </a:extLst>
           </a:blip>
@@ -6319,14 +6557,14 @@
           </a:ln>
           <a:extLst>
             <a:ext uri="{909E8E84-426E-40DD-AFC4-6F175D3DCCD1}">
-              <a14:hiddenFill xmlns:a14="http://schemas.microsoft.com/office/drawing/2010/main">
+              <a14:hiddenFill xmlns:a14="http://schemas.microsoft.com/office/drawing/2010/main" xmlns="">
                 <a:solidFill>
                   <a:schemeClr val="accent1"/>
                 </a:solidFill>
               </a14:hiddenFill>
             </a:ext>
             <a:ext uri="{91240B29-F687-4F45-9708-019B960494DF}">
-              <a14:hiddenLine xmlns:a14="http://schemas.microsoft.com/office/drawing/2010/main" w="9525">
+              <a14:hiddenLine xmlns:a14="http://schemas.microsoft.com/office/drawing/2010/main" xmlns="" w="9525">
                 <a:solidFill>
                   <a:schemeClr val="tx1"/>
                 </a:solidFill>
@@ -6341,7 +6579,7 @@
     </p:spTree>
     <p:extLst>
       <p:ext uri="{BB962C8B-B14F-4D97-AF65-F5344CB8AC3E}">
-        <p14:creationId xmlns:p14="http://schemas.microsoft.com/office/powerpoint/2010/main" val="1075400916"/>
+        <p14:creationId xmlns:p14="http://schemas.microsoft.com/office/powerpoint/2010/main" xmlns="" val="1075400916"/>
       </p:ext>
     </p:extLst>
   </p:cSld>
@@ -6782,7 +7020,7 @@
     </p:spTree>
     <p:extLst>
       <p:ext uri="{BB962C8B-B14F-4D97-AF65-F5344CB8AC3E}">
-        <p14:creationId xmlns:p14="http://schemas.microsoft.com/office/powerpoint/2010/main" val="1550742323"/>
+        <p14:creationId xmlns:p14="http://schemas.microsoft.com/office/powerpoint/2010/main" xmlns="" val="1550742323"/>
       </p:ext>
     </p:extLst>
   </p:cSld>
@@ -6825,9 +7063,10 @@
           <a:lstStyle/>
           <a:p>
             <a:r>
-              <a:rPr lang="de-DE" dirty="0"/>
-              <a:t>Erfüllte Ziele</a:t>
-            </a:r>
+              <a:rPr lang="de-DE" dirty="0" smtClean="0"/>
+              <a:t>Fazit</a:t>
+            </a:r>
+            <a:endParaRPr lang="de-DE" dirty="0"/>
           </a:p>
         </p:txBody>
       </p:sp>
@@ -7006,29 +7245,129 @@
               <a:t>Logische Umsetzung der </a:t>
             </a:r>
             <a:r>
-              <a:rPr lang="de-DE" dirty="0" err="1"/>
+              <a:rPr lang="de-DE" dirty="0" err="1" smtClean="0"/>
               <a:t>Fahrtichtungsanzeiger</a:t>
             </a:r>
+            <a:endParaRPr lang="de-DE" dirty="0" smtClean="0"/>
+          </a:p>
+          <a:p>
+            <a:r>
+              <a:rPr lang="de-DE" dirty="0" smtClean="0"/>
+              <a:t>Effizienz des Codes</a:t>
+            </a:r>
+          </a:p>
+          <a:p>
+            <a:r>
+              <a:rPr lang="de-DE" dirty="0" smtClean="0"/>
+              <a:t>Lesbarer durch weitere Clean Code Umsetzungen</a:t>
+            </a:r>
             <a:endParaRPr lang="de-DE" dirty="0"/>
           </a:p>
-          <a:p>
-            <a:r>
-              <a:rPr lang="de-DE" dirty="0"/>
-              <a:t>Effizienz des Codes</a:t>
-            </a:r>
-          </a:p>
-          <a:p>
-            <a:r>
-              <a:rPr lang="de-DE" dirty="0"/>
-              <a:t>Lesbarer durch weitere Clean Code Umsetzungen</a:t>
-            </a:r>
+        </p:txBody>
+      </p:sp>
+      <p:sp>
+        <p:nvSpPr>
+          <p:cNvPr id="9" name="Rechteck 8"/>
+          <p:cNvSpPr/>
+          <p:nvPr/>
+        </p:nvSpPr>
+        <p:spPr bwMode="auto">
+          <a:xfrm>
+            <a:off x="3059832" y="5229200"/>
+            <a:ext cx="5585179" cy="732582"/>
+          </a:xfrm>
+          <a:prstGeom prst="rect">
+            <a:avLst/>
+          </a:prstGeom>
+          <a:ln>
+            <a:headEnd type="none" w="med" len="med"/>
+            <a:tailEnd type="none" w="med" len="med"/>
+          </a:ln>
+        </p:spPr>
+        <p:style>
+          <a:lnRef idx="2">
+            <a:schemeClr val="dk1">
+              <a:shade val="50000"/>
+            </a:schemeClr>
+          </a:lnRef>
+          <a:fillRef idx="1">
+            <a:schemeClr val="dk1"/>
+          </a:fillRef>
+          <a:effectRef idx="0">
+            <a:schemeClr val="dk1"/>
+          </a:effectRef>
+          <a:fontRef idx="minor">
+            <a:schemeClr val="lt1"/>
+          </a:fontRef>
+        </p:style>
+        <p:txBody>
+          <a:bodyPr vert="horz" wrap="none" lIns="91440" tIns="45720" rIns="91440" bIns="45720" numCol="1" rtlCol="0" anchor="ctr" anchorCtr="0" compatLnSpc="1">
+            <a:prstTxWarp prst="textNoShape">
+              <a:avLst/>
+            </a:prstTxWarp>
+          </a:bodyPr>
+          <a:lstStyle/>
+          <a:p>
+            <a:pPr marL="0" marR="0" indent="0" algn="ctr" defTabSz="914400" rtl="0" eaLnBrk="1" fontAlgn="base" latinLnBrk="0" hangingPunct="1">
+              <a:lnSpc>
+                <a:spcPct val="100000"/>
+              </a:lnSpc>
+              <a:spcBef>
+                <a:spcPct val="0"/>
+              </a:spcBef>
+              <a:spcAft>
+                <a:spcPct val="0"/>
+              </a:spcAft>
+              <a:buClrTx/>
+              <a:buSzTx/>
+              <a:buFontTx/>
+              <a:buNone/>
+              <a:tabLst/>
+            </a:pPr>
+            <a:r>
+              <a:rPr lang="de-DE" sz="1800" dirty="0" smtClean="0"/>
+              <a:t>Überblick über gemeisterte Herausforderungen? </a:t>
+            </a:r>
+            <a:endParaRPr lang="de-DE" sz="1800" dirty="0" smtClean="0"/>
+          </a:p>
+          <a:p>
+            <a:pPr marL="0" marR="0" indent="0" algn="ctr" defTabSz="914400" rtl="0" eaLnBrk="1" fontAlgn="base" latinLnBrk="0" hangingPunct="1">
+              <a:lnSpc>
+                <a:spcPct val="100000"/>
+              </a:lnSpc>
+              <a:spcBef>
+                <a:spcPct val="0"/>
+              </a:spcBef>
+              <a:spcAft>
+                <a:spcPct val="0"/>
+              </a:spcAft>
+              <a:buClrTx/>
+              <a:buSzTx/>
+              <a:buFontTx/>
+              <a:buNone/>
+              <a:tabLst/>
+            </a:pPr>
+            <a:r>
+              <a:rPr lang="de-DE" sz="1800" dirty="0" smtClean="0"/>
+              <a:t>Zu viel Redundanz zu Folie 4 (Features) vermeiden</a:t>
+            </a:r>
+            <a:endParaRPr kumimoji="0" lang="de-DE" sz="1800" b="0" i="0" u="none" strike="noStrike" cap="none" normalizeH="0" baseline="0" dirty="0" smtClean="0">
+              <a:ln>
+                <a:noFill/>
+              </a:ln>
+              <a:solidFill>
+                <a:schemeClr val="tx1"/>
+              </a:solidFill>
+              <a:effectLst/>
+              <a:latin typeface="Arial" charset="0"/>
+            </a:endParaRPr>
           </a:p>
         </p:txBody>
       </p:sp>
     </p:spTree>
     <p:extLst>
       <p:ext uri="{BB962C8B-B14F-4D97-AF65-F5344CB8AC3E}">
-        <p14:creationId xmlns:p14="http://schemas.microsoft.com/office/powerpoint/2010/main" val="76012745"/>
+        <p14:creationId xmlns:p14="http://schemas.microsoft.com/office/powerpoint/2010/main" xmlns="" val="76012745"/>
       </p:ext>
     </p:extLst>
   </p:cSld>
@@ -7313,7 +7652,7 @@
     </p:spTree>
     <p:extLst>
       <p:ext uri="{BB962C8B-B14F-4D97-AF65-F5344CB8AC3E}">
-        <p14:creationId xmlns:p14="http://schemas.microsoft.com/office/powerpoint/2010/main" val="1684480284"/>
+        <p14:creationId xmlns:p14="http://schemas.microsoft.com/office/powerpoint/2010/main" xmlns="" val="1684480284"/>
       </p:ext>
     </p:extLst>
   </p:cSld>
@@ -7414,9 +7753,10 @@
           <a:lstStyle/>
           <a:p>
             <a:r>
-              <a:rPr lang="de-DE" dirty="0"/>
-              <a:t>Fachlabor IT</a:t>
-            </a:r>
+              <a:rPr lang="de-DE" dirty="0" smtClean="0"/>
+              <a:t>Agenda</a:t>
+            </a:r>
+            <a:endParaRPr lang="de-DE" dirty="0"/>
           </a:p>
         </p:txBody>
       </p:sp>
@@ -7760,7 +8100,7 @@
     </p:spTree>
     <p:extLst>
       <p:ext uri="{BB962C8B-B14F-4D97-AF65-F5344CB8AC3E}">
-        <p14:creationId xmlns:p14="http://schemas.microsoft.com/office/powerpoint/2010/main" val="309100733"/>
+        <p14:creationId xmlns:p14="http://schemas.microsoft.com/office/powerpoint/2010/main" xmlns="" val="309100733"/>
       </p:ext>
     </p:extLst>
   </p:cSld>
@@ -8105,7 +8445,7 @@
     </p:spTree>
     <p:extLst>
       <p:ext uri="{BB962C8B-B14F-4D97-AF65-F5344CB8AC3E}">
-        <p14:creationId xmlns:p14="http://schemas.microsoft.com/office/powerpoint/2010/main" val="4221714953"/>
+        <p14:creationId xmlns:p14="http://schemas.microsoft.com/office/powerpoint/2010/main" xmlns="" val="4221714953"/>
       </p:ext>
     </p:extLst>
   </p:cSld>
@@ -8273,7 +8613,7 @@
     </p:spTree>
     <p:extLst>
       <p:ext uri="{BB962C8B-B14F-4D97-AF65-F5344CB8AC3E}">
-        <p14:creationId xmlns:p14="http://schemas.microsoft.com/office/powerpoint/2010/main" val="1893387264"/>
+        <p14:creationId xmlns:p14="http://schemas.microsoft.com/office/powerpoint/2010/main" xmlns="" val="1893387264"/>
       </p:ext>
     </p:extLst>
   </p:cSld>
@@ -8373,9 +8713,10 @@
           <a:lstStyle/>
           <a:p>
             <a:r>
-              <a:rPr lang="de-DE" dirty="0"/>
-              <a:t>Fachlabor IT</a:t>
-            </a:r>
+              <a:rPr lang="de-DE" dirty="0" smtClean="0"/>
+              <a:t>Agenda</a:t>
+            </a:r>
+            <a:endParaRPr lang="de-DE" dirty="0"/>
           </a:p>
         </p:txBody>
       </p:sp>
@@ -8711,7 +9052,7 @@
     </p:spTree>
     <p:extLst>
       <p:ext uri="{BB962C8B-B14F-4D97-AF65-F5344CB8AC3E}">
-        <p14:creationId xmlns:p14="http://schemas.microsoft.com/office/powerpoint/2010/main" val="3395949267"/>
+        <p14:creationId xmlns:p14="http://schemas.microsoft.com/office/powerpoint/2010/main" xmlns="" val="3395949267"/>
       </p:ext>
     </p:extLst>
   </p:cSld>
@@ -8754,11 +9095,11 @@
           <a:lstStyle/>
           <a:p>
             <a:r>
-              <a:rPr lang="de-DE" dirty="0"/>
-              <a:t>II. Klassenübersicht &amp; </a:t>
-            </a:r>
-            <a:r>
-              <a:rPr lang="de-DE" dirty="0" err="1"/>
+              <a:rPr lang="de-DE" dirty="0" smtClean="0"/>
+              <a:t>Ablauf in der </a:t>
+            </a:r>
+            <a:r>
+              <a:rPr lang="de-DE" dirty="0" err="1" smtClean="0"/>
               <a:t>main</a:t>
             </a:r>
             <a:r>
@@ -8905,7 +9246,7 @@
     </p:spTree>
     <p:extLst>
       <p:ext uri="{BB962C8B-B14F-4D97-AF65-F5344CB8AC3E}">
-        <p14:creationId xmlns:p14="http://schemas.microsoft.com/office/powerpoint/2010/main" val="3427100782"/>
+        <p14:creationId xmlns:p14="http://schemas.microsoft.com/office/powerpoint/2010/main" xmlns="" val="3427100782"/>
       </p:ext>
     </p:extLst>
   </p:cSld>
@@ -9099,7 +9440,7 @@
     </p:spTree>
     <p:extLst>
       <p:ext uri="{BB962C8B-B14F-4D97-AF65-F5344CB8AC3E}">
-        <p14:creationId xmlns:p14="http://schemas.microsoft.com/office/powerpoint/2010/main" val="1036794897"/>
+        <p14:creationId xmlns:p14="http://schemas.microsoft.com/office/powerpoint/2010/main" xmlns="" val="1036794897"/>
       </p:ext>
     </p:extLst>
   </p:cSld>
@@ -9342,13 +9683,20 @@
     </p:spTree>
     <p:extLst>
       <p:ext uri="{BB962C8B-B14F-4D97-AF65-F5344CB8AC3E}">
-        <p14:creationId xmlns:p14="http://schemas.microsoft.com/office/powerpoint/2010/main" val="1366462204"/>
+        <p14:creationId xmlns:p14="http://schemas.microsoft.com/office/powerpoint/2010/main" xmlns="" val="1366462204"/>
       </p:ext>
     </p:extLst>
   </p:cSld>
   <p:clrMapOvr>
     <a:masterClrMapping/>
   </p:clrMapOvr>
+  <p:timing>
+    <p:tnLst>
+      <p:par>
+        <p:cTn id="1" dur="indefinite" restart="never" nodeType="tmRoot"/>
+      </p:par>
+    </p:tnLst>
+  </p:timing>
 </p:sld>
 </file>
 
@@ -9555,13 +9903,20 @@
     </p:spTree>
     <p:extLst>
       <p:ext uri="{BB962C8B-B14F-4D97-AF65-F5344CB8AC3E}">
-        <p14:creationId xmlns:p14="http://schemas.microsoft.com/office/powerpoint/2010/main" val="456857022"/>
+        <p14:creationId xmlns:p14="http://schemas.microsoft.com/office/powerpoint/2010/main" xmlns="" val="456857022"/>
       </p:ext>
     </p:extLst>
   </p:cSld>
   <p:clrMapOvr>
     <a:masterClrMapping/>
   </p:clrMapOvr>
+  <p:timing>
+    <p:tnLst>
+      <p:par>
+        <p:cTn id="1" dur="indefinite" restart="never" nodeType="tmRoot"/>
+      </p:par>
+    </p:tnLst>
+  </p:timing>
 </p:sld>
 </file>
 

</xml_diff>